<commit_message>
updates to scripts and ppt
</commit_message>
<xml_diff>
--- a/Thesis_Proposal.pptx
+++ b/Thesis_Proposal.pptx
@@ -126,6 +126,38 @@
 </p:presentation>
 </file>
 
+<file path=ppt/authors.xml><?xml version="1.0" encoding="utf-8"?>
+<p188:authorLst xmlns:a="http://schemas.openxmlformats.org/drawingml/2006/main" xmlns:r="http://schemas.openxmlformats.org/officeDocument/2006/relationships" xmlns:p188="http://schemas.microsoft.com/office/powerpoint/2018/8/main">
+  <p188:author id="{AE4C4272-415B-469C-7E09-FBFEDC1B8FD4}" name="Parker Malek" initials="PM" userId="S::Parker_Malek@abtassoc.com::649560a8-2679-4e32-924f-f29f05d0cdb4" providerId="AD"/>
+</p188:authorLst>
+</file>
+
+<file path=ppt/comments/modernComment_108_BE9E4D0D.xml><?xml version="1.0" encoding="utf-8"?>
+<p188:cmLst xmlns:a="http://schemas.openxmlformats.org/drawingml/2006/main" xmlns:r="http://schemas.openxmlformats.org/officeDocument/2006/relationships" xmlns:p188="http://schemas.microsoft.com/office/powerpoint/2018/8/main">
+  <p188:cm id="{EFCFF9AF-0023-4B4F-8CFB-CF730BE983A5}" authorId="{AE4C4272-415B-469C-7E09-FBFEDC1B8FD4}" created="2023-11-20T23:12:30.340">
+    <ac:txMkLst xmlns:ac="http://schemas.microsoft.com/office/drawing/2013/main/command">
+      <pc:docMk xmlns:pc="http://schemas.microsoft.com/office/powerpoint/2013/main/command"/>
+      <pc:sldMk xmlns:pc="http://schemas.microsoft.com/office/powerpoint/2013/main/command" cId="3198045453" sldId="264"/>
+      <ac:spMk id="3" creationId="{4603F0EE-B752-2373-099C-1101CD9313EA}"/>
+      <ac:txMk cp="126" len="112">
+        <ac:context len="240" hash="1128036284"/>
+      </ac:txMk>
+    </ac:txMkLst>
+    <p188:pos x="4225551" y="2723918"/>
+    <p188:txBody>
+      <a:bodyPr/>
+      <a:lstStyle/>
+      <a:p>
+        <a:r>
+          <a:rPr lang="en-US"/>
+          <a:t>Make this section more clear. Add red lines to delineate pulses on figure</a:t>
+        </a:r>
+      </a:p>
+    </p188:txBody>
+  </p188:cm>
+</p188:cmLst>
+</file>
+
 <file path=ppt/slideLayouts/slideLayout1.xml><?xml version="1.0" encoding="utf-8"?>
 <p:sldLayout xmlns:a="http://schemas.openxmlformats.org/drawingml/2006/main" xmlns:r="http://schemas.openxmlformats.org/officeDocument/2006/relationships" xmlns:p="http://schemas.openxmlformats.org/presentationml/2006/main" type="title" preserve="1">
   <p:cSld name="Title Slide">
@@ -273,7 +305,7 @@
           <a:p>
             <a:fld id="{21DA3ACC-6EC9-4C81-8BB3-B2DFC5BE9780}" type="datetimeFigureOut">
               <a:rPr lang="en-US" smtClean="0"/>
-              <a:t>11/19/2023</a:t>
+              <a:t>11/20/2023</a:t>
             </a:fld>
             <a:endParaRPr lang="en-US"/>
           </a:p>
@@ -471,7 +503,7 @@
           <a:p>
             <a:fld id="{21DA3ACC-6EC9-4C81-8BB3-B2DFC5BE9780}" type="datetimeFigureOut">
               <a:rPr lang="en-US" smtClean="0"/>
-              <a:t>11/19/2023</a:t>
+              <a:t>11/20/2023</a:t>
             </a:fld>
             <a:endParaRPr lang="en-US"/>
           </a:p>
@@ -679,7 +711,7 @@
           <a:p>
             <a:fld id="{21DA3ACC-6EC9-4C81-8BB3-B2DFC5BE9780}" type="datetimeFigureOut">
               <a:rPr lang="en-US" smtClean="0"/>
-              <a:t>11/19/2023</a:t>
+              <a:t>11/20/2023</a:t>
             </a:fld>
             <a:endParaRPr lang="en-US"/>
           </a:p>
@@ -877,7 +909,7 @@
           <a:p>
             <a:fld id="{21DA3ACC-6EC9-4C81-8BB3-B2DFC5BE9780}" type="datetimeFigureOut">
               <a:rPr lang="en-US" smtClean="0"/>
-              <a:t>11/19/2023</a:t>
+              <a:t>11/20/2023</a:t>
             </a:fld>
             <a:endParaRPr lang="en-US"/>
           </a:p>
@@ -1152,7 +1184,7 @@
           <a:p>
             <a:fld id="{21DA3ACC-6EC9-4C81-8BB3-B2DFC5BE9780}" type="datetimeFigureOut">
               <a:rPr lang="en-US" smtClean="0"/>
-              <a:t>11/19/2023</a:t>
+              <a:t>11/20/2023</a:t>
             </a:fld>
             <a:endParaRPr lang="en-US"/>
           </a:p>
@@ -1417,7 +1449,7 @@
           <a:p>
             <a:fld id="{21DA3ACC-6EC9-4C81-8BB3-B2DFC5BE9780}" type="datetimeFigureOut">
               <a:rPr lang="en-US" smtClean="0"/>
-              <a:t>11/19/2023</a:t>
+              <a:t>11/20/2023</a:t>
             </a:fld>
             <a:endParaRPr lang="en-US"/>
           </a:p>
@@ -1829,7 +1861,7 @@
           <a:p>
             <a:fld id="{21DA3ACC-6EC9-4C81-8BB3-B2DFC5BE9780}" type="datetimeFigureOut">
               <a:rPr lang="en-US" smtClean="0"/>
-              <a:t>11/19/2023</a:t>
+              <a:t>11/20/2023</a:t>
             </a:fld>
             <a:endParaRPr lang="en-US"/>
           </a:p>
@@ -1970,7 +2002,7 @@
           <a:p>
             <a:fld id="{21DA3ACC-6EC9-4C81-8BB3-B2DFC5BE9780}" type="datetimeFigureOut">
               <a:rPr lang="en-US" smtClean="0"/>
-              <a:t>11/19/2023</a:t>
+              <a:t>11/20/2023</a:t>
             </a:fld>
             <a:endParaRPr lang="en-US"/>
           </a:p>
@@ -2083,7 +2115,7 @@
           <a:p>
             <a:fld id="{21DA3ACC-6EC9-4C81-8BB3-B2DFC5BE9780}" type="datetimeFigureOut">
               <a:rPr lang="en-US" smtClean="0"/>
-              <a:t>11/19/2023</a:t>
+              <a:t>11/20/2023</a:t>
             </a:fld>
             <a:endParaRPr lang="en-US"/>
           </a:p>
@@ -2394,7 +2426,7 @@
           <a:p>
             <a:fld id="{21DA3ACC-6EC9-4C81-8BB3-B2DFC5BE9780}" type="datetimeFigureOut">
               <a:rPr lang="en-US" smtClean="0"/>
-              <a:t>11/19/2023</a:t>
+              <a:t>11/20/2023</a:t>
             </a:fld>
             <a:endParaRPr lang="en-US"/>
           </a:p>
@@ -2682,7 +2714,7 @@
           <a:p>
             <a:fld id="{21DA3ACC-6EC9-4C81-8BB3-B2DFC5BE9780}" type="datetimeFigureOut">
               <a:rPr lang="en-US" smtClean="0"/>
-              <a:t>11/19/2023</a:t>
+              <a:t>11/20/2023</a:t>
             </a:fld>
             <a:endParaRPr lang="en-US"/>
           </a:p>
@@ -2983,7 +3015,7 @@
           <a:p>
             <a:fld id="{21DA3ACC-6EC9-4C81-8BB3-B2DFC5BE9780}" type="datetimeFigureOut">
               <a:rPr lang="en-US" smtClean="0"/>
-              <a:t>11/19/2023</a:t>
+              <a:t>11/20/2023</a:t>
             </a:fld>
             <a:endParaRPr lang="en-US"/>
           </a:p>
@@ -5940,7 +5972,7 @@
           <p:nvPr/>
         </p:nvPicPr>
         <p:blipFill>
-          <a:blip r:embed="rId2" cstate="print">
+          <a:blip r:embed="rId3" cstate="print">
             <a:extLst>
               <a:ext uri="{28A0092B-C50C-407E-A947-70E740481C1C}">
                 <a14:useLocalDpi xmlns:a14="http://schemas.microsoft.com/office/drawing/2010/main" val="0"/>
@@ -5997,7 +6029,7 @@
           <a:p>
             <a:r>
               <a:rPr lang="en-US" dirty="0"/>
-              <a:t>Methods – Identifying Long-term Events</a:t>
+              <a:t>Methods – Identifying Synoptic-Level Events</a:t>
             </a:r>
           </a:p>
         </p:txBody>
@@ -6068,7 +6100,7 @@
             <a:pPr lvl="1"/>
             <a:r>
               <a:rPr lang="en-US" dirty="0"/>
-              <a:t>Nonzero precipitation preceding and following 12 hours of dryness with at least one hourly rainfall reading of 3mm or above</a:t>
+              <a:t>Period of nonzero precipitation separated by 12 hours of dryness with at least one hourly rainfall reading of 3mm or above</a:t>
             </a:r>
           </a:p>
           <a:p>
@@ -6118,7 +6150,7 @@
             </a:r>
             <a:r>
               <a:rPr lang="da-DK" dirty="0">
-                <a:hlinkClick r:id="rId3"/>
+                <a:hlinkClick r:id="rId4"/>
               </a:rPr>
               <a:t>https://mesowest.utah.edu/</a:t>
             </a:r>
@@ -6223,7 +6255,7 @@
             <a:pPr algn="ctr"/>
             <a:r>
               <a:rPr lang="en-US" sz="1200" dirty="0"/>
-              <a:t>High-Level Event</a:t>
+              <a:t>Synoptic-Scale Event</a:t>
             </a:r>
           </a:p>
         </p:txBody>
@@ -6326,6 +6358,11 @@
   <p:clrMapOvr>
     <a:masterClrMapping/>
   </p:clrMapOvr>
+  <p:extLst>
+    <p:ext uri="{6950BFC3-D8DA-4A85-94F7-54DA5524770B}">
+      <p188:commentRel xmlns:p188="http://schemas.microsoft.com/office/powerpoint/2018/8/main" r:id="rId2"/>
+    </p:ext>
+  </p:extLst>
 </p:sld>
 </file>
 

</xml_diff>